<commit_message>
final commit, goodbye, it was a joy
</commit_message>
<xml_diff>
--- a/Presentation/figures for thesis.pptx
+++ b/Presentation/figures for thesis.pptx
@@ -105,6 +105,11 @@
       </a:defRPr>
     </a:lvl9pPr>
   </p:defaultTextStyle>
+  <p:extLst>
+    <p:ext uri="{EFAFB233-063F-42B5-8137-9DF3F51BA10A}">
+      <p15:sldGuideLst xmlns:p15="http://schemas.microsoft.com/office/powerpoint/2012/main"/>
+    </p:ext>
+  </p:extLst>
 </p:presentation>
 </file>
 
@@ -239,7 +244,7 @@
           <a:p>
             <a:fld id="{FDCC6F3B-1F72-4C64-80E1-E24F313F952F}" type="datetimeFigureOut">
               <a:rPr lang="en-GB" smtClean="0"/>
-              <a:t>21/05/2024</a:t>
+              <a:t>07/06/2024</a:t>
             </a:fld>
             <a:endParaRPr lang="en-GB"/>
           </a:p>
@@ -409,7 +414,7 @@
           <a:p>
             <a:fld id="{FDCC6F3B-1F72-4C64-80E1-E24F313F952F}" type="datetimeFigureOut">
               <a:rPr lang="en-GB" smtClean="0"/>
-              <a:t>21/05/2024</a:t>
+              <a:t>07/06/2024</a:t>
             </a:fld>
             <a:endParaRPr lang="en-GB"/>
           </a:p>
@@ -589,7 +594,7 @@
           <a:p>
             <a:fld id="{FDCC6F3B-1F72-4C64-80E1-E24F313F952F}" type="datetimeFigureOut">
               <a:rPr lang="en-GB" smtClean="0"/>
-              <a:t>21/05/2024</a:t>
+              <a:t>07/06/2024</a:t>
             </a:fld>
             <a:endParaRPr lang="en-GB"/>
           </a:p>
@@ -759,7 +764,7 @@
           <a:p>
             <a:fld id="{FDCC6F3B-1F72-4C64-80E1-E24F313F952F}" type="datetimeFigureOut">
               <a:rPr lang="en-GB" smtClean="0"/>
-              <a:t>21/05/2024</a:t>
+              <a:t>07/06/2024</a:t>
             </a:fld>
             <a:endParaRPr lang="en-GB"/>
           </a:p>
@@ -1005,7 +1010,7 @@
           <a:p>
             <a:fld id="{FDCC6F3B-1F72-4C64-80E1-E24F313F952F}" type="datetimeFigureOut">
               <a:rPr lang="en-GB" smtClean="0"/>
-              <a:t>21/05/2024</a:t>
+              <a:t>07/06/2024</a:t>
             </a:fld>
             <a:endParaRPr lang="en-GB"/>
           </a:p>
@@ -1237,7 +1242,7 @@
           <a:p>
             <a:fld id="{FDCC6F3B-1F72-4C64-80E1-E24F313F952F}" type="datetimeFigureOut">
               <a:rPr lang="en-GB" smtClean="0"/>
-              <a:t>21/05/2024</a:t>
+              <a:t>07/06/2024</a:t>
             </a:fld>
             <a:endParaRPr lang="en-GB"/>
           </a:p>
@@ -1604,7 +1609,7 @@
           <a:p>
             <a:fld id="{FDCC6F3B-1F72-4C64-80E1-E24F313F952F}" type="datetimeFigureOut">
               <a:rPr lang="en-GB" smtClean="0"/>
-              <a:t>21/05/2024</a:t>
+              <a:t>07/06/2024</a:t>
             </a:fld>
             <a:endParaRPr lang="en-GB"/>
           </a:p>
@@ -1722,7 +1727,7 @@
           <a:p>
             <a:fld id="{FDCC6F3B-1F72-4C64-80E1-E24F313F952F}" type="datetimeFigureOut">
               <a:rPr lang="en-GB" smtClean="0"/>
-              <a:t>21/05/2024</a:t>
+              <a:t>07/06/2024</a:t>
             </a:fld>
             <a:endParaRPr lang="en-GB"/>
           </a:p>
@@ -1817,7 +1822,7 @@
           <a:p>
             <a:fld id="{FDCC6F3B-1F72-4C64-80E1-E24F313F952F}" type="datetimeFigureOut">
               <a:rPr lang="en-GB" smtClean="0"/>
-              <a:t>21/05/2024</a:t>
+              <a:t>07/06/2024</a:t>
             </a:fld>
             <a:endParaRPr lang="en-GB"/>
           </a:p>
@@ -2094,7 +2099,7 @@
           <a:p>
             <a:fld id="{FDCC6F3B-1F72-4C64-80E1-E24F313F952F}" type="datetimeFigureOut">
               <a:rPr lang="en-GB" smtClean="0"/>
-              <a:t>21/05/2024</a:t>
+              <a:t>07/06/2024</a:t>
             </a:fld>
             <a:endParaRPr lang="en-GB"/>
           </a:p>
@@ -2351,7 +2356,7 @@
           <a:p>
             <a:fld id="{FDCC6F3B-1F72-4C64-80E1-E24F313F952F}" type="datetimeFigureOut">
               <a:rPr lang="en-GB" smtClean="0"/>
-              <a:t>21/05/2024</a:t>
+              <a:t>07/06/2024</a:t>
             </a:fld>
             <a:endParaRPr lang="en-GB"/>
           </a:p>
@@ -2564,7 +2569,7 @@
           <a:p>
             <a:fld id="{FDCC6F3B-1F72-4C64-80E1-E24F313F952F}" type="datetimeFigureOut">
               <a:rPr lang="en-GB" smtClean="0"/>
-              <a:t>21/05/2024</a:t>
+              <a:t>07/06/2024</a:t>
             </a:fld>
             <a:endParaRPr lang="en-GB"/>
           </a:p>
@@ -7457,6 +7462,41 @@
           <a:chExt cx="0" cy="0"/>
         </a:xfrm>
       </p:grpSpPr>
+      <p:pic>
+        <p:nvPicPr>
+          <p:cNvPr id="3" name="Picture 2" descr="A graph of a graph with blue bars&#10;&#10;Description automatically generated with medium confidence">
+            <a:extLst>
+              <a:ext uri="{FF2B5EF4-FFF2-40B4-BE49-F238E27FC236}">
+                <a16:creationId xmlns:a16="http://schemas.microsoft.com/office/drawing/2014/main" id="{862EE30A-FBD9-21C9-C237-1C30A65CA215}"/>
+              </a:ext>
+            </a:extLst>
+          </p:cNvPr>
+          <p:cNvPicPr>
+            <a:picLocks noChangeAspect="1"/>
+          </p:cNvPicPr>
+          <p:nvPr/>
+        </p:nvPicPr>
+        <p:blipFill rotWithShape="1">
+          <a:blip r:embed="rId2">
+            <a:extLst>
+              <a:ext uri="{28A0092B-C50C-407E-A947-70E740481C1C}">
+                <a14:useLocalDpi xmlns:a14="http://schemas.microsoft.com/office/drawing/2010/main" val="0"/>
+              </a:ext>
+            </a:extLst>
+          </a:blip>
+          <a:srcRect t="5591"/>
+          <a:stretch/>
+        </p:blipFill>
+        <p:spPr>
+          <a:xfrm>
+            <a:off x="510287" y="3189766"/>
+            <a:ext cx="5837426" cy="3748415"/>
+          </a:xfrm>
+          <a:prstGeom prst="rect">
+            <a:avLst/>
+          </a:prstGeom>
+        </p:spPr>
+      </p:pic>
     </p:spTree>
     <p:extLst>
       <p:ext uri="{BB962C8B-B14F-4D97-AF65-F5344CB8AC3E}">

</xml_diff>